<commit_message>
Escrito cap. 3 - Faltam: 4, resultados, conclusão
</commit_message>
<xml_diff>
--- a/diagramas.pptx
+++ b/diagramas.pptx
@@ -7,6 +7,8 @@
   <p:sldIdLst>
     <p:sldId id="256" r:id="rId2"/>
     <p:sldId id="257" r:id="rId3"/>
+    <p:sldId id="258" r:id="rId4"/>
+    <p:sldId id="259" r:id="rId5"/>
   </p:sldIdLst>
   <p:sldSz cx="12192000" cy="6858000"/>
   <p:notesSz cx="6858000" cy="9144000"/>
@@ -272,7 +274,7 @@
           <a:p>
             <a:fld id="{01F862B5-5039-4432-9E1B-8160DCC90A15}" type="datetimeFigureOut">
               <a:rPr lang="en-US" smtClean="0"/>
-              <a:t>10/5/2019</a:t>
+              <a:t>10/20/2019</a:t>
             </a:fld>
             <a:endParaRPr lang="en-US"/>
           </a:p>
@@ -470,7 +472,7 @@
           <a:p>
             <a:fld id="{01F862B5-5039-4432-9E1B-8160DCC90A15}" type="datetimeFigureOut">
               <a:rPr lang="en-US" smtClean="0"/>
-              <a:t>10/5/2019</a:t>
+              <a:t>10/20/2019</a:t>
             </a:fld>
             <a:endParaRPr lang="en-US"/>
           </a:p>
@@ -678,7 +680,7 @@
           <a:p>
             <a:fld id="{01F862B5-5039-4432-9E1B-8160DCC90A15}" type="datetimeFigureOut">
               <a:rPr lang="en-US" smtClean="0"/>
-              <a:t>10/5/2019</a:t>
+              <a:t>10/20/2019</a:t>
             </a:fld>
             <a:endParaRPr lang="en-US"/>
           </a:p>
@@ -876,7 +878,7 @@
           <a:p>
             <a:fld id="{01F862B5-5039-4432-9E1B-8160DCC90A15}" type="datetimeFigureOut">
               <a:rPr lang="en-US" smtClean="0"/>
-              <a:t>10/5/2019</a:t>
+              <a:t>10/20/2019</a:t>
             </a:fld>
             <a:endParaRPr lang="en-US"/>
           </a:p>
@@ -1151,7 +1153,7 @@
           <a:p>
             <a:fld id="{01F862B5-5039-4432-9E1B-8160DCC90A15}" type="datetimeFigureOut">
               <a:rPr lang="en-US" smtClean="0"/>
-              <a:t>10/5/2019</a:t>
+              <a:t>10/20/2019</a:t>
             </a:fld>
             <a:endParaRPr lang="en-US"/>
           </a:p>
@@ -1416,7 +1418,7 @@
           <a:p>
             <a:fld id="{01F862B5-5039-4432-9E1B-8160DCC90A15}" type="datetimeFigureOut">
               <a:rPr lang="en-US" smtClean="0"/>
-              <a:t>10/5/2019</a:t>
+              <a:t>10/20/2019</a:t>
             </a:fld>
             <a:endParaRPr lang="en-US"/>
           </a:p>
@@ -1828,7 +1830,7 @@
           <a:p>
             <a:fld id="{01F862B5-5039-4432-9E1B-8160DCC90A15}" type="datetimeFigureOut">
               <a:rPr lang="en-US" smtClean="0"/>
-              <a:t>10/5/2019</a:t>
+              <a:t>10/20/2019</a:t>
             </a:fld>
             <a:endParaRPr lang="en-US"/>
           </a:p>
@@ -1969,7 +1971,7 @@
           <a:p>
             <a:fld id="{01F862B5-5039-4432-9E1B-8160DCC90A15}" type="datetimeFigureOut">
               <a:rPr lang="en-US" smtClean="0"/>
-              <a:t>10/5/2019</a:t>
+              <a:t>10/20/2019</a:t>
             </a:fld>
             <a:endParaRPr lang="en-US"/>
           </a:p>
@@ -2082,7 +2084,7 @@
           <a:p>
             <a:fld id="{01F862B5-5039-4432-9E1B-8160DCC90A15}" type="datetimeFigureOut">
               <a:rPr lang="en-US" smtClean="0"/>
-              <a:t>10/5/2019</a:t>
+              <a:t>10/20/2019</a:t>
             </a:fld>
             <a:endParaRPr lang="en-US"/>
           </a:p>
@@ -2393,7 +2395,7 @@
           <a:p>
             <a:fld id="{01F862B5-5039-4432-9E1B-8160DCC90A15}" type="datetimeFigureOut">
               <a:rPr lang="en-US" smtClean="0"/>
-              <a:t>10/5/2019</a:t>
+              <a:t>10/20/2019</a:t>
             </a:fld>
             <a:endParaRPr lang="en-US"/>
           </a:p>
@@ -2681,7 +2683,7 @@
           <a:p>
             <a:fld id="{01F862B5-5039-4432-9E1B-8160DCC90A15}" type="datetimeFigureOut">
               <a:rPr lang="en-US" smtClean="0"/>
-              <a:t>10/5/2019</a:t>
+              <a:t>10/20/2019</a:t>
             </a:fld>
             <a:endParaRPr lang="en-US"/>
           </a:p>
@@ -2922,7 +2924,7 @@
           <a:p>
             <a:fld id="{01F862B5-5039-4432-9E1B-8160DCC90A15}" type="datetimeFigureOut">
               <a:rPr lang="en-US" smtClean="0"/>
-              <a:t>10/5/2019</a:t>
+              <a:t>10/20/2019</a:t>
             </a:fld>
             <a:endParaRPr lang="en-US"/>
           </a:p>
@@ -23657,6 +23659,2556 @@
 </p:sld>
 </file>
 
+<file path=ppt/slides/slide3.xml><?xml version="1.0" encoding="utf-8"?>
+<p:sld xmlns:a="http://schemas.openxmlformats.org/drawingml/2006/main" xmlns:r="http://schemas.openxmlformats.org/officeDocument/2006/relationships" xmlns:p="http://schemas.openxmlformats.org/presentationml/2006/main">
+  <p:cSld>
+    <p:spTree>
+      <p:nvGrpSpPr>
+        <p:cNvPr id="1" name=""/>
+        <p:cNvGrpSpPr/>
+        <p:nvPr/>
+      </p:nvGrpSpPr>
+      <p:grpSpPr>
+        <a:xfrm>
+          <a:off x="0" y="0"/>
+          <a:ext cx="0" cy="0"/>
+          <a:chOff x="0" y="0"/>
+          <a:chExt cx="0" cy="0"/>
+        </a:xfrm>
+      </p:grpSpPr>
+      <p:pic>
+        <p:nvPicPr>
+          <p:cNvPr id="1026" name="Picture 2">
+            <a:extLst>
+              <a:ext uri="{FF2B5EF4-FFF2-40B4-BE49-F238E27FC236}">
+                <a16:creationId xmlns:a16="http://schemas.microsoft.com/office/drawing/2014/main" id="{B86AB571-E7B7-4653-83FB-10A712FEE4DC}"/>
+              </a:ext>
+            </a:extLst>
+          </p:cNvPr>
+          <p:cNvPicPr>
+            <a:picLocks noChangeAspect="1" noChangeArrowheads="1"/>
+          </p:cNvPicPr>
+          <p:nvPr/>
+        </p:nvPicPr>
+        <p:blipFill>
+          <a:blip r:embed="rId2">
+            <a:extLst>
+              <a:ext uri="{28A0092B-C50C-407E-A947-70E740481C1C}">
+                <a14:useLocalDpi xmlns:a14="http://schemas.microsoft.com/office/drawing/2010/main" val="0"/>
+              </a:ext>
+            </a:extLst>
+          </a:blip>
+          <a:srcRect/>
+          <a:stretch>
+            <a:fillRect/>
+          </a:stretch>
+        </p:blipFill>
+        <p:spPr bwMode="auto">
+          <a:xfrm>
+            <a:off x="-151855" y="-1"/>
+            <a:ext cx="12343855" cy="6951971"/>
+          </a:xfrm>
+          <a:prstGeom prst="rect">
+            <a:avLst/>
+          </a:prstGeom>
+          <a:noFill/>
+          <a:extLst>
+            <a:ext uri="{909E8E84-426E-40DD-AFC4-6F175D3DCCD1}">
+              <a14:hiddenFill xmlns:a14="http://schemas.microsoft.com/office/drawing/2010/main">
+                <a:solidFill>
+                  <a:srgbClr val="FFFFFF"/>
+                </a:solidFill>
+              </a14:hiddenFill>
+            </a:ext>
+          </a:extLst>
+        </p:spPr>
+      </p:pic>
+    </p:spTree>
+    <p:extLst>
+      <p:ext uri="{BB962C8B-B14F-4D97-AF65-F5344CB8AC3E}">
+        <p14:creationId xmlns:p14="http://schemas.microsoft.com/office/powerpoint/2010/main" val="846155905"/>
+      </p:ext>
+    </p:extLst>
+  </p:cSld>
+  <p:clrMapOvr>
+    <a:masterClrMapping/>
+  </p:clrMapOvr>
+</p:sld>
+</file>
+
+<file path=ppt/slides/slide4.xml><?xml version="1.0" encoding="utf-8"?>
+<p:sld xmlns:a="http://schemas.openxmlformats.org/drawingml/2006/main" xmlns:r="http://schemas.openxmlformats.org/officeDocument/2006/relationships" xmlns:p="http://schemas.openxmlformats.org/presentationml/2006/main">
+  <p:cSld>
+    <p:spTree>
+      <p:nvGrpSpPr>
+        <p:cNvPr id="1" name=""/>
+        <p:cNvGrpSpPr/>
+        <p:nvPr/>
+      </p:nvGrpSpPr>
+      <p:grpSpPr>
+        <a:xfrm>
+          <a:off x="0" y="0"/>
+          <a:ext cx="0" cy="0"/>
+          <a:chOff x="0" y="0"/>
+          <a:chExt cx="0" cy="0"/>
+        </a:xfrm>
+      </p:grpSpPr>
+      <p:sp>
+        <p:nvSpPr>
+          <p:cNvPr id="2" name="Rectangle: Rounded Corners 1">
+            <a:extLst>
+              <a:ext uri="{FF2B5EF4-FFF2-40B4-BE49-F238E27FC236}">
+                <a16:creationId xmlns:a16="http://schemas.microsoft.com/office/drawing/2014/main" id="{1EAB44AD-F11B-49B9-BA3A-21A509556DF0}"/>
+              </a:ext>
+            </a:extLst>
+          </p:cNvPr>
+          <p:cNvSpPr/>
+          <p:nvPr/>
+        </p:nvSpPr>
+        <p:spPr>
+          <a:xfrm>
+            <a:off x="1614543" y="1603373"/>
+            <a:ext cx="923461" cy="702108"/>
+          </a:xfrm>
+          <a:prstGeom prst="roundRect">
+            <a:avLst/>
+          </a:prstGeom>
+          <a:solidFill>
+            <a:schemeClr val="tx2">
+              <a:lumMod val="20000"/>
+              <a:lumOff val="80000"/>
+            </a:schemeClr>
+          </a:solidFill>
+          <a:ln>
+            <a:solidFill>
+              <a:schemeClr val="tx1">
+                <a:lumMod val="95000"/>
+                <a:lumOff val="5000"/>
+              </a:schemeClr>
+            </a:solidFill>
+          </a:ln>
+        </p:spPr>
+        <p:style>
+          <a:lnRef idx="2">
+            <a:schemeClr val="accent1">
+              <a:shade val="50000"/>
+            </a:schemeClr>
+          </a:lnRef>
+          <a:fillRef idx="1">
+            <a:schemeClr val="accent1"/>
+          </a:fillRef>
+          <a:effectRef idx="0">
+            <a:schemeClr val="accent1"/>
+          </a:effectRef>
+          <a:fontRef idx="minor">
+            <a:schemeClr val="lt1"/>
+          </a:fontRef>
+        </p:style>
+        <p:txBody>
+          <a:bodyPr rtlCol="0" anchor="ctr"/>
+          <a:lstStyle/>
+          <a:p>
+            <a:pPr algn="ctr"/>
+            <a:r>
+              <a:rPr lang="en-US" sz="1600" dirty="0">
+                <a:solidFill>
+                  <a:schemeClr val="tx1"/>
+                </a:solidFill>
+              </a:rPr>
+              <a:t>50 MHz </a:t>
+            </a:r>
+            <a:r>
+              <a:rPr lang="en-US" sz="1600" dirty="0" err="1">
+                <a:solidFill>
+                  <a:schemeClr val="tx1"/>
+                </a:solidFill>
+              </a:rPr>
+              <a:t>Clk</a:t>
+            </a:r>
+            <a:endParaRPr lang="en-US" sz="1600" dirty="0">
+              <a:solidFill>
+                <a:schemeClr val="tx1"/>
+              </a:solidFill>
+            </a:endParaRPr>
+          </a:p>
+        </p:txBody>
+      </p:sp>
+      <p:sp>
+        <p:nvSpPr>
+          <p:cNvPr id="5" name="Arrow: Right 4">
+            <a:extLst>
+              <a:ext uri="{FF2B5EF4-FFF2-40B4-BE49-F238E27FC236}">
+                <a16:creationId xmlns:a16="http://schemas.microsoft.com/office/drawing/2014/main" id="{19BC76D2-ABEA-4F27-B18A-EA24EC8DF98F}"/>
+              </a:ext>
+            </a:extLst>
+          </p:cNvPr>
+          <p:cNvSpPr/>
+          <p:nvPr/>
+        </p:nvSpPr>
+        <p:spPr>
+          <a:xfrm>
+            <a:off x="2546062" y="1828921"/>
+            <a:ext cx="457105" cy="251011"/>
+          </a:xfrm>
+          <a:prstGeom prst="rightArrow">
+            <a:avLst/>
+          </a:prstGeom>
+          <a:solidFill>
+            <a:schemeClr val="tx2">
+              <a:lumMod val="20000"/>
+              <a:lumOff val="80000"/>
+            </a:schemeClr>
+          </a:solidFill>
+          <a:ln>
+            <a:solidFill>
+              <a:schemeClr val="tx1">
+                <a:lumMod val="95000"/>
+                <a:lumOff val="5000"/>
+              </a:schemeClr>
+            </a:solidFill>
+          </a:ln>
+        </p:spPr>
+        <p:style>
+          <a:lnRef idx="2">
+            <a:schemeClr val="accent1">
+              <a:shade val="50000"/>
+            </a:schemeClr>
+          </a:lnRef>
+          <a:fillRef idx="1">
+            <a:schemeClr val="accent1"/>
+          </a:fillRef>
+          <a:effectRef idx="0">
+            <a:schemeClr val="accent1"/>
+          </a:effectRef>
+          <a:fontRef idx="minor">
+            <a:schemeClr val="lt1"/>
+          </a:fontRef>
+        </p:style>
+        <p:txBody>
+          <a:bodyPr rtlCol="0" anchor="ctr"/>
+          <a:lstStyle/>
+          <a:p>
+            <a:pPr algn="ctr"/>
+            <a:endParaRPr lang="en-US">
+              <a:solidFill>
+                <a:schemeClr val="tx1"/>
+              </a:solidFill>
+            </a:endParaRPr>
+          </a:p>
+        </p:txBody>
+      </p:sp>
+      <p:sp>
+        <p:nvSpPr>
+          <p:cNvPr id="6" name="Arrow: Right 5">
+            <a:extLst>
+              <a:ext uri="{FF2B5EF4-FFF2-40B4-BE49-F238E27FC236}">
+                <a16:creationId xmlns:a16="http://schemas.microsoft.com/office/drawing/2014/main" id="{7C269734-7680-4DC5-B12F-826BA8C853D9}"/>
+              </a:ext>
+            </a:extLst>
+          </p:cNvPr>
+          <p:cNvSpPr/>
+          <p:nvPr/>
+        </p:nvSpPr>
+        <p:spPr>
+          <a:xfrm>
+            <a:off x="3933494" y="1828921"/>
+            <a:ext cx="457105" cy="251011"/>
+          </a:xfrm>
+          <a:prstGeom prst="rightArrow">
+            <a:avLst/>
+          </a:prstGeom>
+          <a:solidFill>
+            <a:schemeClr val="tx2">
+              <a:lumMod val="20000"/>
+              <a:lumOff val="80000"/>
+            </a:schemeClr>
+          </a:solidFill>
+          <a:ln>
+            <a:solidFill>
+              <a:schemeClr val="tx1">
+                <a:lumMod val="95000"/>
+                <a:lumOff val="5000"/>
+              </a:schemeClr>
+            </a:solidFill>
+          </a:ln>
+        </p:spPr>
+        <p:style>
+          <a:lnRef idx="2">
+            <a:schemeClr val="accent1">
+              <a:shade val="50000"/>
+            </a:schemeClr>
+          </a:lnRef>
+          <a:fillRef idx="1">
+            <a:schemeClr val="accent1"/>
+          </a:fillRef>
+          <a:effectRef idx="0">
+            <a:schemeClr val="accent1"/>
+          </a:effectRef>
+          <a:fontRef idx="minor">
+            <a:schemeClr val="lt1"/>
+          </a:fontRef>
+        </p:style>
+        <p:txBody>
+          <a:bodyPr rtlCol="0" anchor="ctr"/>
+          <a:lstStyle/>
+          <a:p>
+            <a:pPr algn="ctr"/>
+            <a:endParaRPr lang="en-US">
+              <a:solidFill>
+                <a:schemeClr val="tx1"/>
+              </a:solidFill>
+            </a:endParaRPr>
+          </a:p>
+        </p:txBody>
+      </p:sp>
+      <p:grpSp>
+        <p:nvGrpSpPr>
+          <p:cNvPr id="26" name="Group 25">
+            <a:extLst>
+              <a:ext uri="{FF2B5EF4-FFF2-40B4-BE49-F238E27FC236}">
+                <a16:creationId xmlns:a16="http://schemas.microsoft.com/office/drawing/2014/main" id="{63C1F372-2F31-4563-89EE-13A69748A1EC}"/>
+              </a:ext>
+            </a:extLst>
+          </p:cNvPr>
+          <p:cNvGrpSpPr/>
+          <p:nvPr/>
+        </p:nvGrpSpPr>
+        <p:grpSpPr>
+          <a:xfrm>
+            <a:off x="219362" y="2780135"/>
+            <a:ext cx="941289" cy="835143"/>
+            <a:chOff x="2402543" y="2752166"/>
+            <a:chExt cx="941289" cy="835143"/>
+          </a:xfrm>
+          <a:solidFill>
+            <a:schemeClr val="tx2">
+              <a:lumMod val="20000"/>
+              <a:lumOff val="80000"/>
+            </a:schemeClr>
+          </a:solidFill>
+        </p:grpSpPr>
+        <p:sp>
+          <p:nvSpPr>
+            <p:cNvPr id="20" name="Rectangle: Rounded Corners 19">
+              <a:extLst>
+                <a:ext uri="{FF2B5EF4-FFF2-40B4-BE49-F238E27FC236}">
+                  <a16:creationId xmlns:a16="http://schemas.microsoft.com/office/drawing/2014/main" id="{6E1D4818-B5D3-4513-BD8B-14A260B06F53}"/>
+                </a:ext>
+              </a:extLst>
+            </p:cNvPr>
+            <p:cNvSpPr/>
+            <p:nvPr/>
+          </p:nvSpPr>
+          <p:spPr>
+            <a:xfrm>
+              <a:off x="2402543" y="2752166"/>
+              <a:ext cx="779929" cy="664818"/>
+            </a:xfrm>
+            <a:prstGeom prst="roundRect">
+              <a:avLst/>
+            </a:prstGeom>
+            <a:grpFill/>
+            <a:ln>
+              <a:solidFill>
+                <a:schemeClr val="tx1">
+                  <a:lumMod val="95000"/>
+                  <a:lumOff val="5000"/>
+                </a:schemeClr>
+              </a:solidFill>
+            </a:ln>
+          </p:spPr>
+          <p:style>
+            <a:lnRef idx="2">
+              <a:schemeClr val="accent1">
+                <a:shade val="50000"/>
+              </a:schemeClr>
+            </a:lnRef>
+            <a:fillRef idx="1">
+              <a:schemeClr val="accent1"/>
+            </a:fillRef>
+            <a:effectRef idx="0">
+              <a:schemeClr val="accent1"/>
+            </a:effectRef>
+            <a:fontRef idx="minor">
+              <a:schemeClr val="lt1"/>
+            </a:fontRef>
+          </p:style>
+          <p:txBody>
+            <a:bodyPr rtlCol="0" anchor="ctr"/>
+            <a:lstStyle/>
+            <a:p>
+              <a:pPr algn="ctr"/>
+              <a:r>
+                <a:rPr lang="en-US" dirty="0">
+                  <a:solidFill>
+                    <a:schemeClr val="tx1"/>
+                  </a:solidFill>
+                </a:rPr>
+                <a:t>GPIO</a:t>
+              </a:r>
+            </a:p>
+          </p:txBody>
+        </p:sp>
+        <p:sp>
+          <p:nvSpPr>
+            <p:cNvPr id="22" name="Rectangle: Rounded Corners 21">
+              <a:extLst>
+                <a:ext uri="{FF2B5EF4-FFF2-40B4-BE49-F238E27FC236}">
+                  <a16:creationId xmlns:a16="http://schemas.microsoft.com/office/drawing/2014/main" id="{4DE3B045-028C-473E-BB9E-8F401F2EE47B}"/>
+                </a:ext>
+              </a:extLst>
+            </p:cNvPr>
+            <p:cNvSpPr/>
+            <p:nvPr/>
+          </p:nvSpPr>
+          <p:spPr>
+            <a:xfrm>
+              <a:off x="2447363" y="2796986"/>
+              <a:ext cx="779929" cy="664818"/>
+            </a:xfrm>
+            <a:prstGeom prst="roundRect">
+              <a:avLst/>
+            </a:prstGeom>
+            <a:grpFill/>
+            <a:ln>
+              <a:solidFill>
+                <a:schemeClr val="tx1">
+                  <a:lumMod val="95000"/>
+                  <a:lumOff val="5000"/>
+                </a:schemeClr>
+              </a:solidFill>
+            </a:ln>
+          </p:spPr>
+          <p:style>
+            <a:lnRef idx="2">
+              <a:schemeClr val="accent1">
+                <a:shade val="50000"/>
+              </a:schemeClr>
+            </a:lnRef>
+            <a:fillRef idx="1">
+              <a:schemeClr val="accent1"/>
+            </a:fillRef>
+            <a:effectRef idx="0">
+              <a:schemeClr val="accent1"/>
+            </a:effectRef>
+            <a:fontRef idx="minor">
+              <a:schemeClr val="lt1"/>
+            </a:fontRef>
+          </p:style>
+          <p:txBody>
+            <a:bodyPr rtlCol="0" anchor="ctr"/>
+            <a:lstStyle/>
+            <a:p>
+              <a:pPr algn="ctr"/>
+              <a:r>
+                <a:rPr lang="en-US" dirty="0">
+                  <a:solidFill>
+                    <a:schemeClr val="tx1"/>
+                  </a:solidFill>
+                </a:rPr>
+                <a:t>GPIO</a:t>
+              </a:r>
+            </a:p>
+          </p:txBody>
+        </p:sp>
+        <p:sp>
+          <p:nvSpPr>
+            <p:cNvPr id="23" name="Rectangle: Rounded Corners 22">
+              <a:extLst>
+                <a:ext uri="{FF2B5EF4-FFF2-40B4-BE49-F238E27FC236}">
+                  <a16:creationId xmlns:a16="http://schemas.microsoft.com/office/drawing/2014/main" id="{8BE8879D-5D75-44CB-A7B7-EB3CDF084D89}"/>
+                </a:ext>
+              </a:extLst>
+            </p:cNvPr>
+            <p:cNvSpPr/>
+            <p:nvPr/>
+          </p:nvSpPr>
+          <p:spPr>
+            <a:xfrm>
+              <a:off x="2501153" y="2859741"/>
+              <a:ext cx="779929" cy="664818"/>
+            </a:xfrm>
+            <a:prstGeom prst="roundRect">
+              <a:avLst/>
+            </a:prstGeom>
+            <a:grpFill/>
+            <a:ln>
+              <a:solidFill>
+                <a:schemeClr val="tx1">
+                  <a:lumMod val="95000"/>
+                  <a:lumOff val="5000"/>
+                </a:schemeClr>
+              </a:solidFill>
+            </a:ln>
+          </p:spPr>
+          <p:style>
+            <a:lnRef idx="2">
+              <a:schemeClr val="accent1">
+                <a:shade val="50000"/>
+              </a:schemeClr>
+            </a:lnRef>
+            <a:fillRef idx="1">
+              <a:schemeClr val="accent1"/>
+            </a:fillRef>
+            <a:effectRef idx="0">
+              <a:schemeClr val="accent1"/>
+            </a:effectRef>
+            <a:fontRef idx="minor">
+              <a:schemeClr val="lt1"/>
+            </a:fontRef>
+          </p:style>
+          <p:txBody>
+            <a:bodyPr rtlCol="0" anchor="ctr"/>
+            <a:lstStyle/>
+            <a:p>
+              <a:pPr algn="ctr"/>
+              <a:r>
+                <a:rPr lang="en-US" dirty="0">
+                  <a:solidFill>
+                    <a:schemeClr val="tx1"/>
+                  </a:solidFill>
+                </a:rPr>
+                <a:t>GPIO</a:t>
+              </a:r>
+            </a:p>
+          </p:txBody>
+        </p:sp>
+        <p:sp>
+          <p:nvSpPr>
+            <p:cNvPr id="25" name="Rectangle: Rounded Corners 24">
+              <a:extLst>
+                <a:ext uri="{FF2B5EF4-FFF2-40B4-BE49-F238E27FC236}">
+                  <a16:creationId xmlns:a16="http://schemas.microsoft.com/office/drawing/2014/main" id="{D4520056-8539-4991-9E43-CFEB6EBCCD8D}"/>
+                </a:ext>
+              </a:extLst>
+            </p:cNvPr>
+            <p:cNvSpPr/>
+            <p:nvPr/>
+          </p:nvSpPr>
+          <p:spPr>
+            <a:xfrm>
+              <a:off x="2563903" y="2922491"/>
+              <a:ext cx="779929" cy="664818"/>
+            </a:xfrm>
+            <a:prstGeom prst="roundRect">
+              <a:avLst/>
+            </a:prstGeom>
+            <a:grpFill/>
+            <a:ln>
+              <a:solidFill>
+                <a:schemeClr val="tx1">
+                  <a:lumMod val="95000"/>
+                  <a:lumOff val="5000"/>
+                </a:schemeClr>
+              </a:solidFill>
+            </a:ln>
+          </p:spPr>
+          <p:style>
+            <a:lnRef idx="2">
+              <a:schemeClr val="accent1">
+                <a:shade val="50000"/>
+              </a:schemeClr>
+            </a:lnRef>
+            <a:fillRef idx="1">
+              <a:schemeClr val="accent1"/>
+            </a:fillRef>
+            <a:effectRef idx="0">
+              <a:schemeClr val="accent1"/>
+            </a:effectRef>
+            <a:fontRef idx="minor">
+              <a:schemeClr val="lt1"/>
+            </a:fontRef>
+          </p:style>
+          <p:txBody>
+            <a:bodyPr rtlCol="0" anchor="ctr"/>
+            <a:lstStyle/>
+            <a:p>
+              <a:pPr algn="ctr"/>
+              <a:r>
+                <a:rPr lang="en-US" dirty="0">
+                  <a:solidFill>
+                    <a:schemeClr val="tx1"/>
+                  </a:solidFill>
+                </a:rPr>
+                <a:t>PMTs</a:t>
+              </a:r>
+            </a:p>
+          </p:txBody>
+        </p:sp>
+      </p:grpSp>
+      <p:sp>
+        <p:nvSpPr>
+          <p:cNvPr id="27" name="Rectangle: Rounded Corners 26">
+            <a:extLst>
+              <a:ext uri="{FF2B5EF4-FFF2-40B4-BE49-F238E27FC236}">
+                <a16:creationId xmlns:a16="http://schemas.microsoft.com/office/drawing/2014/main" id="{45D32D54-A510-4A2B-A947-39B906A649E8}"/>
+              </a:ext>
+            </a:extLst>
+          </p:cNvPr>
+          <p:cNvSpPr/>
+          <p:nvPr/>
+        </p:nvSpPr>
+        <p:spPr>
+          <a:xfrm>
+            <a:off x="1747770" y="2905640"/>
+            <a:ext cx="753440" cy="664818"/>
+          </a:xfrm>
+          <a:prstGeom prst="roundRect">
+            <a:avLst/>
+          </a:prstGeom>
+          <a:solidFill>
+            <a:schemeClr val="tx2">
+              <a:lumMod val="20000"/>
+              <a:lumOff val="80000"/>
+            </a:schemeClr>
+          </a:solidFill>
+          <a:ln>
+            <a:solidFill>
+              <a:schemeClr val="tx1">
+                <a:lumMod val="95000"/>
+                <a:lumOff val="5000"/>
+              </a:schemeClr>
+            </a:solidFill>
+          </a:ln>
+        </p:spPr>
+        <p:style>
+          <a:lnRef idx="2">
+            <a:schemeClr val="accent1">
+              <a:shade val="50000"/>
+            </a:schemeClr>
+          </a:lnRef>
+          <a:fillRef idx="1">
+            <a:schemeClr val="accent1"/>
+          </a:fillRef>
+          <a:effectRef idx="0">
+            <a:schemeClr val="accent1"/>
+          </a:effectRef>
+          <a:fontRef idx="minor">
+            <a:schemeClr val="lt1"/>
+          </a:fontRef>
+        </p:style>
+        <p:txBody>
+          <a:bodyPr rtlCol="0" anchor="ctr"/>
+          <a:lstStyle/>
+          <a:p>
+            <a:pPr algn="ctr"/>
+            <a:r>
+              <a:rPr lang="en-US" dirty="0">
+                <a:solidFill>
+                  <a:schemeClr val="tx1"/>
+                </a:solidFill>
+              </a:rPr>
+              <a:t>GPIO</a:t>
+            </a:r>
+          </a:p>
+        </p:txBody>
+      </p:sp>
+      <p:sp>
+        <p:nvSpPr>
+          <p:cNvPr id="28" name="Rectangle: Rounded Corners 27">
+            <a:extLst>
+              <a:ext uri="{FF2B5EF4-FFF2-40B4-BE49-F238E27FC236}">
+                <a16:creationId xmlns:a16="http://schemas.microsoft.com/office/drawing/2014/main" id="{6AD76BDE-B04D-4E12-AAC8-8FC16F808E92}"/>
+              </a:ext>
+            </a:extLst>
+          </p:cNvPr>
+          <p:cNvSpPr/>
+          <p:nvPr/>
+        </p:nvSpPr>
+        <p:spPr>
+          <a:xfrm>
+            <a:off x="3003167" y="1603373"/>
+            <a:ext cx="923461" cy="702108"/>
+          </a:xfrm>
+          <a:prstGeom prst="roundRect">
+            <a:avLst/>
+          </a:prstGeom>
+          <a:solidFill>
+            <a:schemeClr val="tx2">
+              <a:lumMod val="20000"/>
+              <a:lumOff val="80000"/>
+            </a:schemeClr>
+          </a:solidFill>
+          <a:ln>
+            <a:solidFill>
+              <a:schemeClr val="tx1">
+                <a:lumMod val="95000"/>
+                <a:lumOff val="5000"/>
+              </a:schemeClr>
+            </a:solidFill>
+          </a:ln>
+        </p:spPr>
+        <p:style>
+          <a:lnRef idx="2">
+            <a:schemeClr val="accent1">
+              <a:shade val="50000"/>
+            </a:schemeClr>
+          </a:lnRef>
+          <a:fillRef idx="1">
+            <a:schemeClr val="accent1"/>
+          </a:fillRef>
+          <a:effectRef idx="0">
+            <a:schemeClr val="accent1"/>
+          </a:effectRef>
+          <a:fontRef idx="minor">
+            <a:schemeClr val="lt1"/>
+          </a:fontRef>
+        </p:style>
+        <p:txBody>
+          <a:bodyPr rtlCol="0" anchor="ctr"/>
+          <a:lstStyle/>
+          <a:p>
+            <a:pPr algn="ctr"/>
+            <a:r>
+              <a:rPr lang="en-US" sz="1600" dirty="0">
+                <a:solidFill>
+                  <a:schemeClr val="tx1"/>
+                </a:solidFill>
+              </a:rPr>
+              <a:t>PLL</a:t>
+            </a:r>
+          </a:p>
+        </p:txBody>
+      </p:sp>
+      <p:sp>
+        <p:nvSpPr>
+          <p:cNvPr id="29" name="Rectangle: Rounded Corners 28">
+            <a:extLst>
+              <a:ext uri="{FF2B5EF4-FFF2-40B4-BE49-F238E27FC236}">
+                <a16:creationId xmlns:a16="http://schemas.microsoft.com/office/drawing/2014/main" id="{8B59E776-7B1E-4412-A4B1-9DD687C38657}"/>
+              </a:ext>
+            </a:extLst>
+          </p:cNvPr>
+          <p:cNvSpPr/>
+          <p:nvPr/>
+        </p:nvSpPr>
+        <p:spPr>
+          <a:xfrm>
+            <a:off x="4402373" y="1603373"/>
+            <a:ext cx="923461" cy="702108"/>
+          </a:xfrm>
+          <a:prstGeom prst="roundRect">
+            <a:avLst/>
+          </a:prstGeom>
+          <a:solidFill>
+            <a:schemeClr val="tx2">
+              <a:lumMod val="20000"/>
+              <a:lumOff val="80000"/>
+            </a:schemeClr>
+          </a:solidFill>
+          <a:ln>
+            <a:solidFill>
+              <a:schemeClr val="tx1">
+                <a:lumMod val="95000"/>
+                <a:lumOff val="5000"/>
+              </a:schemeClr>
+            </a:solidFill>
+          </a:ln>
+        </p:spPr>
+        <p:style>
+          <a:lnRef idx="2">
+            <a:schemeClr val="accent1">
+              <a:shade val="50000"/>
+            </a:schemeClr>
+          </a:lnRef>
+          <a:fillRef idx="1">
+            <a:schemeClr val="accent1"/>
+          </a:fillRef>
+          <a:effectRef idx="0">
+            <a:schemeClr val="accent1"/>
+          </a:effectRef>
+          <a:fontRef idx="minor">
+            <a:schemeClr val="lt1"/>
+          </a:fontRef>
+        </p:style>
+        <p:txBody>
+          <a:bodyPr rtlCol="0" anchor="ctr"/>
+          <a:lstStyle/>
+          <a:p>
+            <a:pPr algn="ctr"/>
+            <a:r>
+              <a:rPr lang="en-US" sz="1600" dirty="0">
+                <a:solidFill>
+                  <a:schemeClr val="tx1"/>
+                </a:solidFill>
+              </a:rPr>
+              <a:t>200 MHz </a:t>
+            </a:r>
+            <a:r>
+              <a:rPr lang="en-US" sz="1600" dirty="0" err="1">
+                <a:solidFill>
+                  <a:schemeClr val="tx1"/>
+                </a:solidFill>
+              </a:rPr>
+              <a:t>Clk</a:t>
+            </a:r>
+            <a:endParaRPr lang="en-US" sz="1600" dirty="0">
+              <a:solidFill>
+                <a:schemeClr val="tx1"/>
+              </a:solidFill>
+            </a:endParaRPr>
+          </a:p>
+        </p:txBody>
+      </p:sp>
+      <p:grpSp>
+        <p:nvGrpSpPr>
+          <p:cNvPr id="41" name="Group 40">
+            <a:extLst>
+              <a:ext uri="{FF2B5EF4-FFF2-40B4-BE49-F238E27FC236}">
+                <a16:creationId xmlns:a16="http://schemas.microsoft.com/office/drawing/2014/main" id="{830289D9-6ADE-427B-9029-073038351FFA}"/>
+              </a:ext>
+            </a:extLst>
+          </p:cNvPr>
+          <p:cNvGrpSpPr/>
+          <p:nvPr/>
+        </p:nvGrpSpPr>
+        <p:grpSpPr>
+          <a:xfrm>
+            <a:off x="2996570" y="4232178"/>
+            <a:ext cx="941289" cy="1132184"/>
+            <a:chOff x="2124695" y="3943895"/>
+            <a:chExt cx="941289" cy="1132184"/>
+          </a:xfrm>
+          <a:solidFill>
+            <a:schemeClr val="tx2">
+              <a:lumMod val="20000"/>
+              <a:lumOff val="80000"/>
+            </a:schemeClr>
+          </a:solidFill>
+        </p:grpSpPr>
+        <p:grpSp>
+          <p:nvGrpSpPr>
+            <p:cNvPr id="35" name="Group 34">
+              <a:extLst>
+                <a:ext uri="{FF2B5EF4-FFF2-40B4-BE49-F238E27FC236}">
+                  <a16:creationId xmlns:a16="http://schemas.microsoft.com/office/drawing/2014/main" id="{C2CA1C0A-F00B-4006-9202-80442F9B3E18}"/>
+                </a:ext>
+              </a:extLst>
+            </p:cNvPr>
+            <p:cNvGrpSpPr/>
+            <p:nvPr/>
+          </p:nvGrpSpPr>
+          <p:grpSpPr>
+            <a:xfrm>
+              <a:off x="2124695" y="3943895"/>
+              <a:ext cx="941289" cy="835143"/>
+              <a:chOff x="2402543" y="2752166"/>
+              <a:chExt cx="941289" cy="835143"/>
+            </a:xfrm>
+            <a:grpFill/>
+          </p:grpSpPr>
+          <p:sp>
+            <p:nvSpPr>
+              <p:cNvPr id="36" name="Rectangle: Rounded Corners 35">
+                <a:extLst>
+                  <a:ext uri="{FF2B5EF4-FFF2-40B4-BE49-F238E27FC236}">
+                    <a16:creationId xmlns:a16="http://schemas.microsoft.com/office/drawing/2014/main" id="{B1CB3F03-99F8-4D5F-AFE1-C6CD40927BDC}"/>
+                  </a:ext>
+                </a:extLst>
+              </p:cNvPr>
+              <p:cNvSpPr/>
+              <p:nvPr/>
+            </p:nvSpPr>
+            <p:spPr>
+              <a:xfrm>
+                <a:off x="2402543" y="2752166"/>
+                <a:ext cx="779929" cy="664818"/>
+              </a:xfrm>
+              <a:prstGeom prst="roundRect">
+                <a:avLst/>
+              </a:prstGeom>
+              <a:grpFill/>
+              <a:ln>
+                <a:solidFill>
+                  <a:schemeClr val="tx1">
+                    <a:lumMod val="95000"/>
+                    <a:lumOff val="5000"/>
+                  </a:schemeClr>
+                </a:solidFill>
+              </a:ln>
+            </p:spPr>
+            <p:style>
+              <a:lnRef idx="2">
+                <a:schemeClr val="accent1">
+                  <a:shade val="50000"/>
+                </a:schemeClr>
+              </a:lnRef>
+              <a:fillRef idx="1">
+                <a:schemeClr val="accent1"/>
+              </a:fillRef>
+              <a:effectRef idx="0">
+                <a:schemeClr val="accent1"/>
+              </a:effectRef>
+              <a:fontRef idx="minor">
+                <a:schemeClr val="lt1"/>
+              </a:fontRef>
+            </p:style>
+            <p:txBody>
+              <a:bodyPr rtlCol="0" anchor="ctr"/>
+              <a:lstStyle/>
+              <a:p>
+                <a:pPr algn="ctr"/>
+                <a:r>
+                  <a:rPr lang="en-US" dirty="0">
+                    <a:solidFill>
+                      <a:schemeClr val="tx1"/>
+                    </a:solidFill>
+                  </a:rPr>
+                  <a:t>GPIO</a:t>
+                </a:r>
+              </a:p>
+            </p:txBody>
+          </p:sp>
+          <p:sp>
+            <p:nvSpPr>
+              <p:cNvPr id="37" name="Rectangle: Rounded Corners 36">
+                <a:extLst>
+                  <a:ext uri="{FF2B5EF4-FFF2-40B4-BE49-F238E27FC236}">
+                    <a16:creationId xmlns:a16="http://schemas.microsoft.com/office/drawing/2014/main" id="{0300DDA5-AE62-4B72-B9B0-1CAA7D882839}"/>
+                  </a:ext>
+                </a:extLst>
+              </p:cNvPr>
+              <p:cNvSpPr/>
+              <p:nvPr/>
+            </p:nvSpPr>
+            <p:spPr>
+              <a:xfrm>
+                <a:off x="2447363" y="2796986"/>
+                <a:ext cx="779929" cy="664818"/>
+              </a:xfrm>
+              <a:prstGeom prst="roundRect">
+                <a:avLst/>
+              </a:prstGeom>
+              <a:grpFill/>
+              <a:ln>
+                <a:solidFill>
+                  <a:schemeClr val="tx1">
+                    <a:lumMod val="95000"/>
+                    <a:lumOff val="5000"/>
+                  </a:schemeClr>
+                </a:solidFill>
+              </a:ln>
+            </p:spPr>
+            <p:style>
+              <a:lnRef idx="2">
+                <a:schemeClr val="accent1">
+                  <a:shade val="50000"/>
+                </a:schemeClr>
+              </a:lnRef>
+              <a:fillRef idx="1">
+                <a:schemeClr val="accent1"/>
+              </a:fillRef>
+              <a:effectRef idx="0">
+                <a:schemeClr val="accent1"/>
+              </a:effectRef>
+              <a:fontRef idx="minor">
+                <a:schemeClr val="lt1"/>
+              </a:fontRef>
+            </p:style>
+            <p:txBody>
+              <a:bodyPr rtlCol="0" anchor="ctr"/>
+              <a:lstStyle/>
+              <a:p>
+                <a:pPr algn="ctr"/>
+                <a:r>
+                  <a:rPr lang="en-US" dirty="0">
+                    <a:solidFill>
+                      <a:schemeClr val="tx1"/>
+                    </a:solidFill>
+                  </a:rPr>
+                  <a:t>GPIO</a:t>
+                </a:r>
+              </a:p>
+            </p:txBody>
+          </p:sp>
+          <p:sp>
+            <p:nvSpPr>
+              <p:cNvPr id="38" name="Rectangle: Rounded Corners 37">
+                <a:extLst>
+                  <a:ext uri="{FF2B5EF4-FFF2-40B4-BE49-F238E27FC236}">
+                    <a16:creationId xmlns:a16="http://schemas.microsoft.com/office/drawing/2014/main" id="{AEE293A4-D6A0-4BF6-B9E0-9EB77EEBC715}"/>
+                  </a:ext>
+                </a:extLst>
+              </p:cNvPr>
+              <p:cNvSpPr/>
+              <p:nvPr/>
+            </p:nvSpPr>
+            <p:spPr>
+              <a:xfrm>
+                <a:off x="2501153" y="2859741"/>
+                <a:ext cx="779929" cy="664818"/>
+              </a:xfrm>
+              <a:prstGeom prst="roundRect">
+                <a:avLst/>
+              </a:prstGeom>
+              <a:grpFill/>
+              <a:ln>
+                <a:solidFill>
+                  <a:schemeClr val="tx1">
+                    <a:lumMod val="95000"/>
+                    <a:lumOff val="5000"/>
+                  </a:schemeClr>
+                </a:solidFill>
+              </a:ln>
+            </p:spPr>
+            <p:style>
+              <a:lnRef idx="2">
+                <a:schemeClr val="accent1">
+                  <a:shade val="50000"/>
+                </a:schemeClr>
+              </a:lnRef>
+              <a:fillRef idx="1">
+                <a:schemeClr val="accent1"/>
+              </a:fillRef>
+              <a:effectRef idx="0">
+                <a:schemeClr val="accent1"/>
+              </a:effectRef>
+              <a:fontRef idx="minor">
+                <a:schemeClr val="lt1"/>
+              </a:fontRef>
+            </p:style>
+            <p:txBody>
+              <a:bodyPr rtlCol="0" anchor="ctr"/>
+              <a:lstStyle/>
+              <a:p>
+                <a:pPr algn="ctr"/>
+                <a:r>
+                  <a:rPr lang="en-US" dirty="0">
+                    <a:solidFill>
+                      <a:schemeClr val="tx1"/>
+                    </a:solidFill>
+                  </a:rPr>
+                  <a:t>GPIO</a:t>
+                </a:r>
+              </a:p>
+            </p:txBody>
+          </p:sp>
+          <p:sp>
+            <p:nvSpPr>
+              <p:cNvPr id="39" name="Rectangle: Rounded Corners 38">
+                <a:extLst>
+                  <a:ext uri="{FF2B5EF4-FFF2-40B4-BE49-F238E27FC236}">
+                    <a16:creationId xmlns:a16="http://schemas.microsoft.com/office/drawing/2014/main" id="{6192C626-EBC5-4474-9332-37CBF86707F9}"/>
+                  </a:ext>
+                </a:extLst>
+              </p:cNvPr>
+              <p:cNvSpPr/>
+              <p:nvPr/>
+            </p:nvSpPr>
+            <p:spPr>
+              <a:xfrm>
+                <a:off x="2563903" y="2922491"/>
+                <a:ext cx="779929" cy="664818"/>
+              </a:xfrm>
+              <a:prstGeom prst="roundRect">
+                <a:avLst/>
+              </a:prstGeom>
+              <a:grpFill/>
+              <a:ln>
+                <a:solidFill>
+                  <a:schemeClr val="tx1">
+                    <a:lumMod val="95000"/>
+                    <a:lumOff val="5000"/>
+                  </a:schemeClr>
+                </a:solidFill>
+              </a:ln>
+            </p:spPr>
+            <p:style>
+              <a:lnRef idx="2">
+                <a:schemeClr val="accent1">
+                  <a:shade val="50000"/>
+                </a:schemeClr>
+              </a:lnRef>
+              <a:fillRef idx="1">
+                <a:schemeClr val="accent1"/>
+              </a:fillRef>
+              <a:effectRef idx="0">
+                <a:schemeClr val="accent1"/>
+              </a:effectRef>
+              <a:fontRef idx="minor">
+                <a:schemeClr val="lt1"/>
+              </a:fontRef>
+            </p:style>
+            <p:txBody>
+              <a:bodyPr rtlCol="0" anchor="ctr"/>
+              <a:lstStyle/>
+              <a:p>
+                <a:pPr algn="ctr"/>
+                <a:r>
+                  <a:rPr lang="en-US" dirty="0">
+                    <a:solidFill>
+                      <a:schemeClr val="tx1"/>
+                    </a:solidFill>
+                  </a:rPr>
+                  <a:t>SW</a:t>
+                </a:r>
+              </a:p>
+            </p:txBody>
+          </p:sp>
+        </p:grpSp>
+        <p:sp>
+          <p:nvSpPr>
+            <p:cNvPr id="40" name="TextBox 39">
+              <a:extLst>
+                <a:ext uri="{FF2B5EF4-FFF2-40B4-BE49-F238E27FC236}">
+                  <a16:creationId xmlns:a16="http://schemas.microsoft.com/office/drawing/2014/main" id="{1BE43246-C038-4A46-A2BB-DF70881F664C}"/>
+                </a:ext>
+              </a:extLst>
+            </p:cNvPr>
+            <p:cNvSpPr txBox="1"/>
+            <p:nvPr/>
+          </p:nvSpPr>
+          <p:spPr>
+            <a:xfrm>
+              <a:off x="2664812" y="4706747"/>
+              <a:ext cx="401072" cy="369332"/>
+            </a:xfrm>
+            <a:prstGeom prst="rect">
+              <a:avLst/>
+            </a:prstGeom>
+            <a:grpFill/>
+            <a:ln>
+              <a:solidFill>
+                <a:schemeClr val="tx1">
+                  <a:lumMod val="95000"/>
+                  <a:lumOff val="5000"/>
+                </a:schemeClr>
+              </a:solidFill>
+            </a:ln>
+          </p:spPr>
+          <p:txBody>
+            <a:bodyPr wrap="none" rtlCol="0">
+              <a:spAutoFit/>
+            </a:bodyPr>
+            <a:lstStyle/>
+            <a:p>
+              <a:r>
+                <a:rPr lang="en-US" dirty="0"/>
+                <a:t>x8</a:t>
+              </a:r>
+            </a:p>
+          </p:txBody>
+        </p:sp>
+      </p:grpSp>
+      <p:sp>
+        <p:nvSpPr>
+          <p:cNvPr id="42" name="Arrow: Right 41">
+            <a:extLst>
+              <a:ext uri="{FF2B5EF4-FFF2-40B4-BE49-F238E27FC236}">
+                <a16:creationId xmlns:a16="http://schemas.microsoft.com/office/drawing/2014/main" id="{B3C59862-25DA-44CA-B640-5B20EEFD9C3C}"/>
+              </a:ext>
+            </a:extLst>
+          </p:cNvPr>
+          <p:cNvSpPr/>
+          <p:nvPr/>
+        </p:nvSpPr>
+        <p:spPr>
+          <a:xfrm rot="16200000">
+            <a:off x="3210257" y="3781165"/>
+            <a:ext cx="457105" cy="251011"/>
+          </a:xfrm>
+          <a:prstGeom prst="rightArrow">
+            <a:avLst/>
+          </a:prstGeom>
+          <a:solidFill>
+            <a:schemeClr val="tx2">
+              <a:lumMod val="20000"/>
+              <a:lumOff val="80000"/>
+            </a:schemeClr>
+          </a:solidFill>
+          <a:ln>
+            <a:solidFill>
+              <a:schemeClr val="tx1">
+                <a:lumMod val="95000"/>
+                <a:lumOff val="5000"/>
+              </a:schemeClr>
+            </a:solidFill>
+          </a:ln>
+        </p:spPr>
+        <p:style>
+          <a:lnRef idx="2">
+            <a:schemeClr val="accent1">
+              <a:shade val="50000"/>
+            </a:schemeClr>
+          </a:lnRef>
+          <a:fillRef idx="1">
+            <a:schemeClr val="accent1"/>
+          </a:fillRef>
+          <a:effectRef idx="0">
+            <a:schemeClr val="accent1"/>
+          </a:effectRef>
+          <a:fontRef idx="minor">
+            <a:schemeClr val="lt1"/>
+          </a:fontRef>
+        </p:style>
+        <p:txBody>
+          <a:bodyPr rtlCol="0" anchor="ctr"/>
+          <a:lstStyle/>
+          <a:p>
+            <a:pPr algn="ctr"/>
+            <a:endParaRPr lang="en-US">
+              <a:solidFill>
+                <a:schemeClr val="tx1"/>
+              </a:solidFill>
+            </a:endParaRPr>
+          </a:p>
+        </p:txBody>
+      </p:sp>
+      <p:sp>
+        <p:nvSpPr>
+          <p:cNvPr id="44" name="Arrow: Right 43">
+            <a:extLst>
+              <a:ext uri="{FF2B5EF4-FFF2-40B4-BE49-F238E27FC236}">
+                <a16:creationId xmlns:a16="http://schemas.microsoft.com/office/drawing/2014/main" id="{6B78F4C5-ACE7-4947-950E-710492A32AC8}"/>
+              </a:ext>
+            </a:extLst>
+          </p:cNvPr>
+          <p:cNvSpPr/>
+          <p:nvPr/>
+        </p:nvSpPr>
+        <p:spPr>
+          <a:xfrm>
+            <a:off x="1224308" y="3131362"/>
+            <a:ext cx="457105" cy="251011"/>
+          </a:xfrm>
+          <a:prstGeom prst="rightArrow">
+            <a:avLst/>
+          </a:prstGeom>
+          <a:solidFill>
+            <a:schemeClr val="tx2">
+              <a:lumMod val="20000"/>
+              <a:lumOff val="80000"/>
+            </a:schemeClr>
+          </a:solidFill>
+          <a:ln>
+            <a:solidFill>
+              <a:schemeClr val="tx1">
+                <a:lumMod val="95000"/>
+                <a:lumOff val="5000"/>
+              </a:schemeClr>
+            </a:solidFill>
+          </a:ln>
+        </p:spPr>
+        <p:style>
+          <a:lnRef idx="2">
+            <a:schemeClr val="accent1">
+              <a:shade val="50000"/>
+            </a:schemeClr>
+          </a:lnRef>
+          <a:fillRef idx="1">
+            <a:schemeClr val="accent1"/>
+          </a:fillRef>
+          <a:effectRef idx="0">
+            <a:schemeClr val="accent1"/>
+          </a:effectRef>
+          <a:fontRef idx="minor">
+            <a:schemeClr val="lt1"/>
+          </a:fontRef>
+        </p:style>
+        <p:txBody>
+          <a:bodyPr rtlCol="0" anchor="ctr"/>
+          <a:lstStyle/>
+          <a:p>
+            <a:pPr algn="ctr"/>
+            <a:endParaRPr lang="en-US">
+              <a:solidFill>
+                <a:schemeClr val="tx1"/>
+              </a:solidFill>
+            </a:endParaRPr>
+          </a:p>
+        </p:txBody>
+      </p:sp>
+      <p:sp>
+        <p:nvSpPr>
+          <p:cNvPr id="52" name="Flowchart: Manual Operation 51">
+            <a:extLst>
+              <a:ext uri="{FF2B5EF4-FFF2-40B4-BE49-F238E27FC236}">
+                <a16:creationId xmlns:a16="http://schemas.microsoft.com/office/drawing/2014/main" id="{965B9FEB-59FC-49BE-B1F0-EDF370845507}"/>
+              </a:ext>
+            </a:extLst>
+          </p:cNvPr>
+          <p:cNvSpPr/>
+          <p:nvPr/>
+        </p:nvSpPr>
+        <p:spPr>
+          <a:xfrm rot="16200000">
+            <a:off x="2999544" y="2960418"/>
+            <a:ext cx="911557" cy="519400"/>
+          </a:xfrm>
+          <a:prstGeom prst="flowChartManualOperation">
+            <a:avLst/>
+          </a:prstGeom>
+          <a:solidFill>
+            <a:schemeClr val="tx2">
+              <a:lumMod val="20000"/>
+              <a:lumOff val="80000"/>
+            </a:schemeClr>
+          </a:solidFill>
+          <a:ln>
+            <a:solidFill>
+              <a:schemeClr val="tx1">
+                <a:lumMod val="95000"/>
+                <a:lumOff val="5000"/>
+              </a:schemeClr>
+            </a:solidFill>
+          </a:ln>
+        </p:spPr>
+        <p:style>
+          <a:lnRef idx="2">
+            <a:schemeClr val="accent1">
+              <a:shade val="50000"/>
+            </a:schemeClr>
+          </a:lnRef>
+          <a:fillRef idx="1">
+            <a:schemeClr val="accent1"/>
+          </a:fillRef>
+          <a:effectRef idx="0">
+            <a:schemeClr val="accent1"/>
+          </a:effectRef>
+          <a:fontRef idx="minor">
+            <a:schemeClr val="lt1"/>
+          </a:fontRef>
+        </p:style>
+        <p:txBody>
+          <a:bodyPr vert="vert" rtlCol="0" anchor="ctr"/>
+          <a:lstStyle/>
+          <a:p>
+            <a:pPr algn="ctr"/>
+            <a:r>
+              <a:rPr lang="en-US" dirty="0">
+                <a:solidFill>
+                  <a:schemeClr val="tx1"/>
+                </a:solidFill>
+              </a:rPr>
+              <a:t>A-H</a:t>
+            </a:r>
+          </a:p>
+        </p:txBody>
+      </p:sp>
+      <p:sp>
+        <p:nvSpPr>
+          <p:cNvPr id="53" name="Rectangle: Rounded Corners 52">
+            <a:extLst>
+              <a:ext uri="{FF2B5EF4-FFF2-40B4-BE49-F238E27FC236}">
+                <a16:creationId xmlns:a16="http://schemas.microsoft.com/office/drawing/2014/main" id="{418788E4-1CF2-4FFE-AEF8-4021F682379F}"/>
+              </a:ext>
+            </a:extLst>
+          </p:cNvPr>
+          <p:cNvSpPr/>
+          <p:nvPr/>
+        </p:nvSpPr>
+        <p:spPr>
+          <a:xfrm>
+            <a:off x="5820219" y="1620922"/>
+            <a:ext cx="923461" cy="702108"/>
+          </a:xfrm>
+          <a:prstGeom prst="roundRect">
+            <a:avLst/>
+          </a:prstGeom>
+          <a:solidFill>
+            <a:schemeClr val="tx2">
+              <a:lumMod val="20000"/>
+              <a:lumOff val="80000"/>
+            </a:schemeClr>
+          </a:solidFill>
+          <a:ln>
+            <a:solidFill>
+              <a:schemeClr val="tx1">
+                <a:lumMod val="95000"/>
+                <a:lumOff val="5000"/>
+              </a:schemeClr>
+            </a:solidFill>
+          </a:ln>
+        </p:spPr>
+        <p:style>
+          <a:lnRef idx="2">
+            <a:schemeClr val="accent1">
+              <a:shade val="50000"/>
+            </a:schemeClr>
+          </a:lnRef>
+          <a:fillRef idx="1">
+            <a:schemeClr val="accent1"/>
+          </a:fillRef>
+          <a:effectRef idx="0">
+            <a:schemeClr val="accent1"/>
+          </a:effectRef>
+          <a:fontRef idx="minor">
+            <a:schemeClr val="lt1"/>
+          </a:fontRef>
+        </p:style>
+        <p:txBody>
+          <a:bodyPr rtlCol="0" anchor="ctr"/>
+          <a:lstStyle/>
+          <a:p>
+            <a:pPr algn="ctr"/>
+            <a:r>
+              <a:rPr lang="en-US" sz="1400" dirty="0">
+                <a:solidFill>
+                  <a:schemeClr val="tx1"/>
+                </a:solidFill>
+              </a:rPr>
+              <a:t>Data trigger counter</a:t>
+            </a:r>
+          </a:p>
+        </p:txBody>
+      </p:sp>
+      <p:sp>
+        <p:nvSpPr>
+          <p:cNvPr id="54" name="Arrow: Right 53">
+            <a:extLst>
+              <a:ext uri="{FF2B5EF4-FFF2-40B4-BE49-F238E27FC236}">
+                <a16:creationId xmlns:a16="http://schemas.microsoft.com/office/drawing/2014/main" id="{729CB8F5-4BB5-4CF5-8843-1652FFFDADA7}"/>
+              </a:ext>
+            </a:extLst>
+          </p:cNvPr>
+          <p:cNvSpPr/>
+          <p:nvPr/>
+        </p:nvSpPr>
+        <p:spPr>
+          <a:xfrm>
+            <a:off x="2543107" y="3131362"/>
+            <a:ext cx="589765" cy="214261"/>
+          </a:xfrm>
+          <a:prstGeom prst="rightArrow">
+            <a:avLst/>
+          </a:prstGeom>
+          <a:solidFill>
+            <a:schemeClr val="tx2">
+              <a:lumMod val="20000"/>
+              <a:lumOff val="80000"/>
+            </a:schemeClr>
+          </a:solidFill>
+          <a:ln>
+            <a:solidFill>
+              <a:schemeClr val="tx1">
+                <a:lumMod val="95000"/>
+                <a:lumOff val="5000"/>
+              </a:schemeClr>
+            </a:solidFill>
+          </a:ln>
+        </p:spPr>
+        <p:style>
+          <a:lnRef idx="2">
+            <a:schemeClr val="accent1">
+              <a:shade val="50000"/>
+            </a:schemeClr>
+          </a:lnRef>
+          <a:fillRef idx="1">
+            <a:schemeClr val="accent1"/>
+          </a:fillRef>
+          <a:effectRef idx="0">
+            <a:schemeClr val="accent1"/>
+          </a:effectRef>
+          <a:fontRef idx="minor">
+            <a:schemeClr val="lt1"/>
+          </a:fontRef>
+        </p:style>
+        <p:txBody>
+          <a:bodyPr rtlCol="0" anchor="ctr"/>
+          <a:lstStyle/>
+          <a:p>
+            <a:pPr algn="ctr"/>
+            <a:endParaRPr lang="en-US">
+              <a:solidFill>
+                <a:schemeClr val="tx1"/>
+              </a:solidFill>
+            </a:endParaRPr>
+          </a:p>
+        </p:txBody>
+      </p:sp>
+      <p:sp>
+        <p:nvSpPr>
+          <p:cNvPr id="61" name="Rectangle: Rounded Corners 60">
+            <a:extLst>
+              <a:ext uri="{FF2B5EF4-FFF2-40B4-BE49-F238E27FC236}">
+                <a16:creationId xmlns:a16="http://schemas.microsoft.com/office/drawing/2014/main" id="{7A019E4B-B4ED-49CB-9A65-D1CEEDA9D6C8}"/>
+              </a:ext>
+            </a:extLst>
+          </p:cNvPr>
+          <p:cNvSpPr/>
+          <p:nvPr/>
+        </p:nvSpPr>
+        <p:spPr>
+          <a:xfrm>
+            <a:off x="4238260" y="2838803"/>
+            <a:ext cx="1112905" cy="724646"/>
+          </a:xfrm>
+          <a:prstGeom prst="roundRect">
+            <a:avLst/>
+          </a:prstGeom>
+          <a:solidFill>
+            <a:schemeClr val="tx2">
+              <a:lumMod val="20000"/>
+              <a:lumOff val="80000"/>
+            </a:schemeClr>
+          </a:solidFill>
+          <a:ln>
+            <a:solidFill>
+              <a:schemeClr val="tx1">
+                <a:lumMod val="95000"/>
+                <a:lumOff val="5000"/>
+              </a:schemeClr>
+            </a:solidFill>
+          </a:ln>
+        </p:spPr>
+        <p:style>
+          <a:lnRef idx="2">
+            <a:schemeClr val="accent1">
+              <a:shade val="50000"/>
+            </a:schemeClr>
+          </a:lnRef>
+          <a:fillRef idx="1">
+            <a:schemeClr val="accent1"/>
+          </a:fillRef>
+          <a:effectRef idx="0">
+            <a:schemeClr val="accent1"/>
+          </a:effectRef>
+          <a:fontRef idx="minor">
+            <a:schemeClr val="lt1"/>
+          </a:fontRef>
+        </p:style>
+        <p:txBody>
+          <a:bodyPr rtlCol="0" anchor="ctr"/>
+          <a:lstStyle/>
+          <a:p>
+            <a:pPr algn="ctr"/>
+            <a:r>
+              <a:rPr lang="en-US" sz="1600" dirty="0">
+                <a:solidFill>
+                  <a:schemeClr val="tx1"/>
+                </a:solidFill>
+              </a:rPr>
+              <a:t>32-b Counters</a:t>
+            </a:r>
+          </a:p>
+        </p:txBody>
+      </p:sp>
+      <p:sp>
+        <p:nvSpPr>
+          <p:cNvPr id="58" name="TextBox 57">
+            <a:extLst>
+              <a:ext uri="{FF2B5EF4-FFF2-40B4-BE49-F238E27FC236}">
+                <a16:creationId xmlns:a16="http://schemas.microsoft.com/office/drawing/2014/main" id="{DDBF8E48-75C4-4455-AB7B-DF051C4883EA}"/>
+              </a:ext>
+            </a:extLst>
+          </p:cNvPr>
+          <p:cNvSpPr txBox="1"/>
+          <p:nvPr/>
+        </p:nvSpPr>
+        <p:spPr>
+          <a:xfrm>
+            <a:off x="5192974" y="3634592"/>
+            <a:ext cx="401071" cy="369332"/>
+          </a:xfrm>
+          <a:prstGeom prst="rect">
+            <a:avLst/>
+          </a:prstGeom>
+          <a:solidFill>
+            <a:schemeClr val="bg1"/>
+          </a:solidFill>
+          <a:ln>
+            <a:noFill/>
+          </a:ln>
+        </p:spPr>
+        <p:txBody>
+          <a:bodyPr wrap="none" rtlCol="0">
+            <a:spAutoFit/>
+          </a:bodyPr>
+          <a:lstStyle/>
+          <a:p>
+            <a:r>
+              <a:rPr lang="en-US" dirty="0"/>
+              <a:t>x8</a:t>
+            </a:r>
+          </a:p>
+        </p:txBody>
+      </p:sp>
+      <p:sp>
+        <p:nvSpPr>
+          <p:cNvPr id="63" name="Arrow: Right 62">
+            <a:extLst>
+              <a:ext uri="{FF2B5EF4-FFF2-40B4-BE49-F238E27FC236}">
+                <a16:creationId xmlns:a16="http://schemas.microsoft.com/office/drawing/2014/main" id="{558E8D25-CAB2-4526-B6A0-8EBB1579A17F}"/>
+              </a:ext>
+            </a:extLst>
+          </p:cNvPr>
+          <p:cNvSpPr/>
+          <p:nvPr/>
+        </p:nvSpPr>
+        <p:spPr>
+          <a:xfrm>
+            <a:off x="3733863" y="3103577"/>
+            <a:ext cx="491058" cy="233079"/>
+          </a:xfrm>
+          <a:prstGeom prst="rightArrow">
+            <a:avLst/>
+          </a:prstGeom>
+          <a:solidFill>
+            <a:schemeClr val="tx2">
+              <a:lumMod val="20000"/>
+              <a:lumOff val="80000"/>
+            </a:schemeClr>
+          </a:solidFill>
+          <a:ln>
+            <a:solidFill>
+              <a:schemeClr val="tx1">
+                <a:lumMod val="95000"/>
+                <a:lumOff val="5000"/>
+              </a:schemeClr>
+            </a:solidFill>
+          </a:ln>
+        </p:spPr>
+        <p:style>
+          <a:lnRef idx="2">
+            <a:schemeClr val="accent1">
+              <a:shade val="50000"/>
+            </a:schemeClr>
+          </a:lnRef>
+          <a:fillRef idx="1">
+            <a:schemeClr val="accent1"/>
+          </a:fillRef>
+          <a:effectRef idx="0">
+            <a:schemeClr val="accent1"/>
+          </a:effectRef>
+          <a:fontRef idx="minor">
+            <a:schemeClr val="lt1"/>
+          </a:fontRef>
+        </p:style>
+        <p:txBody>
+          <a:bodyPr rtlCol="0" anchor="ctr"/>
+          <a:lstStyle/>
+          <a:p>
+            <a:pPr algn="ctr"/>
+            <a:endParaRPr lang="en-US">
+              <a:solidFill>
+                <a:schemeClr val="tx1"/>
+              </a:solidFill>
+            </a:endParaRPr>
+          </a:p>
+        </p:txBody>
+      </p:sp>
+      <p:sp>
+        <p:nvSpPr>
+          <p:cNvPr id="64" name="Arrow: Right 63">
+            <a:extLst>
+              <a:ext uri="{FF2B5EF4-FFF2-40B4-BE49-F238E27FC236}">
+                <a16:creationId xmlns:a16="http://schemas.microsoft.com/office/drawing/2014/main" id="{84D63868-A2F6-430B-A2BB-98B87B1811F9}"/>
+              </a:ext>
+            </a:extLst>
+          </p:cNvPr>
+          <p:cNvSpPr/>
+          <p:nvPr/>
+        </p:nvSpPr>
+        <p:spPr>
+          <a:xfrm rot="5400000">
+            <a:off x="4527719" y="2450141"/>
+            <a:ext cx="457105" cy="251011"/>
+          </a:xfrm>
+          <a:prstGeom prst="rightArrow">
+            <a:avLst/>
+          </a:prstGeom>
+          <a:solidFill>
+            <a:schemeClr val="tx2">
+              <a:lumMod val="20000"/>
+              <a:lumOff val="80000"/>
+            </a:schemeClr>
+          </a:solidFill>
+          <a:ln>
+            <a:solidFill>
+              <a:schemeClr val="tx1">
+                <a:lumMod val="95000"/>
+                <a:lumOff val="5000"/>
+              </a:schemeClr>
+            </a:solidFill>
+          </a:ln>
+        </p:spPr>
+        <p:style>
+          <a:lnRef idx="2">
+            <a:schemeClr val="accent1">
+              <a:shade val="50000"/>
+            </a:schemeClr>
+          </a:lnRef>
+          <a:fillRef idx="1">
+            <a:schemeClr val="accent1"/>
+          </a:fillRef>
+          <a:effectRef idx="0">
+            <a:schemeClr val="accent1"/>
+          </a:effectRef>
+          <a:fontRef idx="minor">
+            <a:schemeClr val="lt1"/>
+          </a:fontRef>
+        </p:style>
+        <p:txBody>
+          <a:bodyPr rtlCol="0" anchor="ctr"/>
+          <a:lstStyle/>
+          <a:p>
+            <a:pPr algn="ctr"/>
+            <a:endParaRPr lang="en-US">
+              <a:solidFill>
+                <a:schemeClr val="tx1"/>
+              </a:solidFill>
+            </a:endParaRPr>
+          </a:p>
+        </p:txBody>
+      </p:sp>
+      <p:sp>
+        <p:nvSpPr>
+          <p:cNvPr id="65" name="Arrow: Right 64">
+            <a:extLst>
+              <a:ext uri="{FF2B5EF4-FFF2-40B4-BE49-F238E27FC236}">
+                <a16:creationId xmlns:a16="http://schemas.microsoft.com/office/drawing/2014/main" id="{DE00079A-D286-4A7F-91C1-865CD8753874}"/>
+              </a:ext>
+            </a:extLst>
+          </p:cNvPr>
+          <p:cNvSpPr/>
+          <p:nvPr/>
+        </p:nvSpPr>
+        <p:spPr>
+          <a:xfrm>
+            <a:off x="5344474" y="1828921"/>
+            <a:ext cx="457105" cy="251011"/>
+          </a:xfrm>
+          <a:prstGeom prst="rightArrow">
+            <a:avLst/>
+          </a:prstGeom>
+          <a:solidFill>
+            <a:schemeClr val="tx2">
+              <a:lumMod val="20000"/>
+              <a:lumOff val="80000"/>
+            </a:schemeClr>
+          </a:solidFill>
+          <a:ln>
+            <a:solidFill>
+              <a:schemeClr val="tx1">
+                <a:lumMod val="95000"/>
+                <a:lumOff val="5000"/>
+              </a:schemeClr>
+            </a:solidFill>
+          </a:ln>
+        </p:spPr>
+        <p:style>
+          <a:lnRef idx="2">
+            <a:schemeClr val="accent1">
+              <a:shade val="50000"/>
+            </a:schemeClr>
+          </a:lnRef>
+          <a:fillRef idx="1">
+            <a:schemeClr val="accent1"/>
+          </a:fillRef>
+          <a:effectRef idx="0">
+            <a:schemeClr val="accent1"/>
+          </a:effectRef>
+          <a:fontRef idx="minor">
+            <a:schemeClr val="lt1"/>
+          </a:fontRef>
+        </p:style>
+        <p:txBody>
+          <a:bodyPr rtlCol="0" anchor="ctr"/>
+          <a:lstStyle/>
+          <a:p>
+            <a:pPr algn="ctr"/>
+            <a:endParaRPr lang="en-US">
+              <a:solidFill>
+                <a:schemeClr val="tx1"/>
+              </a:solidFill>
+            </a:endParaRPr>
+          </a:p>
+        </p:txBody>
+      </p:sp>
+      <p:sp>
+        <p:nvSpPr>
+          <p:cNvPr id="66" name="Arrow: Right 65">
+            <a:extLst>
+              <a:ext uri="{FF2B5EF4-FFF2-40B4-BE49-F238E27FC236}">
+                <a16:creationId xmlns:a16="http://schemas.microsoft.com/office/drawing/2014/main" id="{F4E8CB52-81E0-4F40-AEB8-9BBB0A5466FA}"/>
+              </a:ext>
+            </a:extLst>
+          </p:cNvPr>
+          <p:cNvSpPr/>
+          <p:nvPr/>
+        </p:nvSpPr>
+        <p:spPr>
+          <a:xfrm>
+            <a:off x="5486951" y="3029952"/>
+            <a:ext cx="519401" cy="315672"/>
+          </a:xfrm>
+          <a:prstGeom prst="rightArrow">
+            <a:avLst/>
+          </a:prstGeom>
+          <a:solidFill>
+            <a:schemeClr val="tx2">
+              <a:lumMod val="20000"/>
+              <a:lumOff val="80000"/>
+            </a:schemeClr>
+          </a:solidFill>
+          <a:ln>
+            <a:solidFill>
+              <a:schemeClr val="tx1">
+                <a:lumMod val="95000"/>
+                <a:lumOff val="5000"/>
+              </a:schemeClr>
+            </a:solidFill>
+          </a:ln>
+        </p:spPr>
+        <p:style>
+          <a:lnRef idx="2">
+            <a:schemeClr val="accent1">
+              <a:shade val="50000"/>
+            </a:schemeClr>
+          </a:lnRef>
+          <a:fillRef idx="1">
+            <a:schemeClr val="accent1"/>
+          </a:fillRef>
+          <a:effectRef idx="0">
+            <a:schemeClr val="accent1"/>
+          </a:effectRef>
+          <a:fontRef idx="minor">
+            <a:schemeClr val="lt1"/>
+          </a:fontRef>
+        </p:style>
+        <p:txBody>
+          <a:bodyPr rtlCol="0" anchor="ctr"/>
+          <a:lstStyle/>
+          <a:p>
+            <a:pPr algn="ctr"/>
+            <a:endParaRPr lang="en-US">
+              <a:solidFill>
+                <a:schemeClr val="tx1"/>
+              </a:solidFill>
+            </a:endParaRPr>
+          </a:p>
+        </p:txBody>
+      </p:sp>
+      <p:sp>
+        <p:nvSpPr>
+          <p:cNvPr id="67" name="Flowchart: Manual Operation 66">
+            <a:extLst>
+              <a:ext uri="{FF2B5EF4-FFF2-40B4-BE49-F238E27FC236}">
+                <a16:creationId xmlns:a16="http://schemas.microsoft.com/office/drawing/2014/main" id="{844CBEFD-BFBE-4200-BEA9-9A40265C2CAE}"/>
+              </a:ext>
+            </a:extLst>
+          </p:cNvPr>
+          <p:cNvSpPr/>
+          <p:nvPr/>
+        </p:nvSpPr>
+        <p:spPr>
+          <a:xfrm rot="16200000">
+            <a:off x="5788287" y="2949949"/>
+            <a:ext cx="911557" cy="519400"/>
+          </a:xfrm>
+          <a:prstGeom prst="flowChartManualOperation">
+            <a:avLst/>
+          </a:prstGeom>
+          <a:solidFill>
+            <a:schemeClr val="tx2">
+              <a:lumMod val="20000"/>
+              <a:lumOff val="80000"/>
+            </a:schemeClr>
+          </a:solidFill>
+          <a:ln>
+            <a:solidFill>
+              <a:schemeClr val="tx1">
+                <a:lumMod val="95000"/>
+                <a:lumOff val="5000"/>
+              </a:schemeClr>
+            </a:solidFill>
+          </a:ln>
+        </p:spPr>
+        <p:style>
+          <a:lnRef idx="2">
+            <a:schemeClr val="accent1">
+              <a:shade val="50000"/>
+            </a:schemeClr>
+          </a:lnRef>
+          <a:fillRef idx="1">
+            <a:schemeClr val="accent1"/>
+          </a:fillRef>
+          <a:effectRef idx="0">
+            <a:schemeClr val="accent1"/>
+          </a:effectRef>
+          <a:fontRef idx="minor">
+            <a:schemeClr val="lt1"/>
+          </a:fontRef>
+        </p:style>
+        <p:txBody>
+          <a:bodyPr vert="vert" rtlCol="0" anchor="ctr"/>
+          <a:lstStyle/>
+          <a:p>
+            <a:pPr algn="ctr"/>
+            <a:r>
+              <a:rPr lang="en-US" dirty="0">
+                <a:solidFill>
+                  <a:schemeClr val="tx1"/>
+                </a:solidFill>
+              </a:rPr>
+              <a:t>A-H Out</a:t>
+            </a:r>
+          </a:p>
+        </p:txBody>
+      </p:sp>
+      <p:sp>
+        <p:nvSpPr>
+          <p:cNvPr id="68" name="Rectangle: Rounded Corners 67">
+            <a:extLst>
+              <a:ext uri="{FF2B5EF4-FFF2-40B4-BE49-F238E27FC236}">
+                <a16:creationId xmlns:a16="http://schemas.microsoft.com/office/drawing/2014/main" id="{248C039C-F597-4163-88CE-75CAF405BB5F}"/>
+              </a:ext>
+            </a:extLst>
+          </p:cNvPr>
+          <p:cNvSpPr/>
+          <p:nvPr/>
+        </p:nvSpPr>
+        <p:spPr>
+          <a:xfrm>
+            <a:off x="7190796" y="2743392"/>
+            <a:ext cx="849980" cy="911558"/>
+          </a:xfrm>
+          <a:prstGeom prst="roundRect">
+            <a:avLst/>
+          </a:prstGeom>
+          <a:solidFill>
+            <a:schemeClr val="tx2">
+              <a:lumMod val="20000"/>
+              <a:lumOff val="80000"/>
+            </a:schemeClr>
+          </a:solidFill>
+          <a:ln>
+            <a:solidFill>
+              <a:schemeClr val="tx1">
+                <a:lumMod val="95000"/>
+                <a:lumOff val="5000"/>
+              </a:schemeClr>
+            </a:solidFill>
+          </a:ln>
+        </p:spPr>
+        <p:style>
+          <a:lnRef idx="2">
+            <a:schemeClr val="accent1">
+              <a:shade val="50000"/>
+            </a:schemeClr>
+          </a:lnRef>
+          <a:fillRef idx="1">
+            <a:schemeClr val="accent1"/>
+          </a:fillRef>
+          <a:effectRef idx="0">
+            <a:schemeClr val="accent1"/>
+          </a:effectRef>
+          <a:fontRef idx="minor">
+            <a:schemeClr val="lt1"/>
+          </a:fontRef>
+        </p:style>
+        <p:txBody>
+          <a:bodyPr rtlCol="0" anchor="ctr"/>
+          <a:lstStyle/>
+          <a:p>
+            <a:pPr algn="ctr"/>
+            <a:r>
+              <a:rPr lang="en-US" sz="1400" dirty="0">
+                <a:solidFill>
+                  <a:schemeClr val="tx1"/>
+                </a:solidFill>
+              </a:rPr>
+              <a:t>Data Out</a:t>
+            </a:r>
+            <a:br>
+              <a:rPr lang="en-US" sz="1400" dirty="0">
+                <a:solidFill>
+                  <a:schemeClr val="tx1"/>
+                </a:solidFill>
+              </a:rPr>
+            </a:br>
+            <a:r>
+              <a:rPr lang="en-US" sz="1400" dirty="0">
+                <a:solidFill>
+                  <a:schemeClr val="tx1"/>
+                </a:solidFill>
+              </a:rPr>
+              <a:t>A - H</a:t>
+            </a:r>
+          </a:p>
+        </p:txBody>
+      </p:sp>
+      <p:sp>
+        <p:nvSpPr>
+          <p:cNvPr id="69" name="Arrow: Bent-Up 68">
+            <a:extLst>
+              <a:ext uri="{FF2B5EF4-FFF2-40B4-BE49-F238E27FC236}">
+                <a16:creationId xmlns:a16="http://schemas.microsoft.com/office/drawing/2014/main" id="{048A2D75-297F-4648-8CDE-81F80BAB270A}"/>
+              </a:ext>
+            </a:extLst>
+          </p:cNvPr>
+          <p:cNvSpPr/>
+          <p:nvPr/>
+        </p:nvSpPr>
+        <p:spPr>
+          <a:xfrm flipV="1">
+            <a:off x="6845189" y="1976721"/>
+            <a:ext cx="849981" cy="524526"/>
+          </a:xfrm>
+          <a:prstGeom prst="bentUpArrow">
+            <a:avLst>
+              <a:gd name="adj1" fmla="val 20017"/>
+              <a:gd name="adj2" fmla="val 22459"/>
+              <a:gd name="adj3" fmla="val 25932"/>
+            </a:avLst>
+          </a:prstGeom>
+          <a:solidFill>
+            <a:schemeClr val="tx2">
+              <a:lumMod val="20000"/>
+              <a:lumOff val="80000"/>
+            </a:schemeClr>
+          </a:solidFill>
+          <a:ln>
+            <a:solidFill>
+              <a:schemeClr val="tx1">
+                <a:lumMod val="95000"/>
+                <a:lumOff val="5000"/>
+              </a:schemeClr>
+            </a:solidFill>
+          </a:ln>
+        </p:spPr>
+        <p:style>
+          <a:lnRef idx="2">
+            <a:schemeClr val="accent1">
+              <a:shade val="50000"/>
+            </a:schemeClr>
+          </a:lnRef>
+          <a:fillRef idx="1">
+            <a:schemeClr val="accent1"/>
+          </a:fillRef>
+          <a:effectRef idx="0">
+            <a:schemeClr val="accent1"/>
+          </a:effectRef>
+          <a:fontRef idx="minor">
+            <a:schemeClr val="lt1"/>
+          </a:fontRef>
+        </p:style>
+        <p:txBody>
+          <a:bodyPr rtlCol="0" anchor="ctr"/>
+          <a:lstStyle/>
+          <a:p>
+            <a:pPr algn="ctr"/>
+            <a:endParaRPr lang="en-US">
+              <a:solidFill>
+                <a:schemeClr val="tx1"/>
+              </a:solidFill>
+            </a:endParaRPr>
+          </a:p>
+        </p:txBody>
+      </p:sp>
+      <p:sp>
+        <p:nvSpPr>
+          <p:cNvPr id="72" name="Arrow: Right 71">
+            <a:extLst>
+              <a:ext uri="{FF2B5EF4-FFF2-40B4-BE49-F238E27FC236}">
+                <a16:creationId xmlns:a16="http://schemas.microsoft.com/office/drawing/2014/main" id="{B32E8E6D-E74D-4B7F-9AC9-9FF522FE22AC}"/>
+              </a:ext>
+            </a:extLst>
+          </p:cNvPr>
+          <p:cNvSpPr/>
+          <p:nvPr/>
+        </p:nvSpPr>
+        <p:spPr>
+          <a:xfrm>
+            <a:off x="6513438" y="3131362"/>
+            <a:ext cx="591387" cy="214261"/>
+          </a:xfrm>
+          <a:prstGeom prst="rightArrow">
+            <a:avLst/>
+          </a:prstGeom>
+          <a:solidFill>
+            <a:schemeClr val="tx2">
+              <a:lumMod val="20000"/>
+              <a:lumOff val="80000"/>
+            </a:schemeClr>
+          </a:solidFill>
+          <a:ln>
+            <a:solidFill>
+              <a:schemeClr val="tx1">
+                <a:lumMod val="95000"/>
+                <a:lumOff val="5000"/>
+              </a:schemeClr>
+            </a:solidFill>
+          </a:ln>
+        </p:spPr>
+        <p:style>
+          <a:lnRef idx="2">
+            <a:schemeClr val="accent1">
+              <a:shade val="50000"/>
+            </a:schemeClr>
+          </a:lnRef>
+          <a:fillRef idx="1">
+            <a:schemeClr val="accent1"/>
+          </a:fillRef>
+          <a:effectRef idx="0">
+            <a:schemeClr val="accent1"/>
+          </a:effectRef>
+          <a:fontRef idx="minor">
+            <a:schemeClr val="lt1"/>
+          </a:fontRef>
+        </p:style>
+        <p:txBody>
+          <a:bodyPr rtlCol="0" anchor="ctr"/>
+          <a:lstStyle/>
+          <a:p>
+            <a:pPr algn="ctr"/>
+            <a:endParaRPr lang="en-US">
+              <a:solidFill>
+                <a:schemeClr val="tx1"/>
+              </a:solidFill>
+            </a:endParaRPr>
+          </a:p>
+        </p:txBody>
+      </p:sp>
+      <p:sp>
+        <p:nvSpPr>
+          <p:cNvPr id="73" name="Rectangle: Rounded Corners 72">
+            <a:extLst>
+              <a:ext uri="{FF2B5EF4-FFF2-40B4-BE49-F238E27FC236}">
+                <a16:creationId xmlns:a16="http://schemas.microsoft.com/office/drawing/2014/main" id="{C08B3572-B3D7-4859-8359-65C49884891B}"/>
+              </a:ext>
+            </a:extLst>
+          </p:cNvPr>
+          <p:cNvSpPr/>
+          <p:nvPr/>
+        </p:nvSpPr>
+        <p:spPr>
+          <a:xfrm>
+            <a:off x="8683458" y="2770667"/>
+            <a:ext cx="849980" cy="911558"/>
+          </a:xfrm>
+          <a:prstGeom prst="roundRect">
+            <a:avLst/>
+          </a:prstGeom>
+          <a:solidFill>
+            <a:schemeClr val="tx2">
+              <a:lumMod val="20000"/>
+              <a:lumOff val="80000"/>
+            </a:schemeClr>
+          </a:solidFill>
+          <a:ln>
+            <a:solidFill>
+              <a:schemeClr val="tx1">
+                <a:lumMod val="95000"/>
+                <a:lumOff val="5000"/>
+              </a:schemeClr>
+            </a:solidFill>
+          </a:ln>
+        </p:spPr>
+        <p:style>
+          <a:lnRef idx="2">
+            <a:schemeClr val="accent1">
+              <a:shade val="50000"/>
+            </a:schemeClr>
+          </a:lnRef>
+          <a:fillRef idx="1">
+            <a:schemeClr val="accent1"/>
+          </a:fillRef>
+          <a:effectRef idx="0">
+            <a:schemeClr val="accent1"/>
+          </a:effectRef>
+          <a:fontRef idx="minor">
+            <a:schemeClr val="lt1"/>
+          </a:fontRef>
+        </p:style>
+        <p:txBody>
+          <a:bodyPr rtlCol="0" anchor="ctr"/>
+          <a:lstStyle/>
+          <a:p>
+            <a:pPr algn="ctr"/>
+            <a:r>
+              <a:rPr lang="en-US" sz="1400" dirty="0">
+                <a:solidFill>
+                  <a:schemeClr val="tx1"/>
+                </a:solidFill>
+              </a:rPr>
+              <a:t>UART TX</a:t>
+            </a:r>
+          </a:p>
+        </p:txBody>
+      </p:sp>
+      <p:sp>
+        <p:nvSpPr>
+          <p:cNvPr id="74" name="Arrow: Right 73">
+            <a:extLst>
+              <a:ext uri="{FF2B5EF4-FFF2-40B4-BE49-F238E27FC236}">
+                <a16:creationId xmlns:a16="http://schemas.microsoft.com/office/drawing/2014/main" id="{2DB82B68-7DFA-4DF6-8C0F-515A5181C069}"/>
+              </a:ext>
+            </a:extLst>
+          </p:cNvPr>
+          <p:cNvSpPr/>
+          <p:nvPr/>
+        </p:nvSpPr>
+        <p:spPr>
+          <a:xfrm>
+            <a:off x="8068836" y="3133149"/>
+            <a:ext cx="591387" cy="214261"/>
+          </a:xfrm>
+          <a:prstGeom prst="rightArrow">
+            <a:avLst/>
+          </a:prstGeom>
+          <a:solidFill>
+            <a:schemeClr val="tx2">
+              <a:lumMod val="20000"/>
+              <a:lumOff val="80000"/>
+            </a:schemeClr>
+          </a:solidFill>
+          <a:ln>
+            <a:solidFill>
+              <a:schemeClr val="tx1">
+                <a:lumMod val="95000"/>
+                <a:lumOff val="5000"/>
+              </a:schemeClr>
+            </a:solidFill>
+          </a:ln>
+        </p:spPr>
+        <p:style>
+          <a:lnRef idx="2">
+            <a:schemeClr val="accent1">
+              <a:shade val="50000"/>
+            </a:schemeClr>
+          </a:lnRef>
+          <a:fillRef idx="1">
+            <a:schemeClr val="accent1"/>
+          </a:fillRef>
+          <a:effectRef idx="0">
+            <a:schemeClr val="accent1"/>
+          </a:effectRef>
+          <a:fontRef idx="minor">
+            <a:schemeClr val="lt1"/>
+          </a:fontRef>
+        </p:style>
+        <p:txBody>
+          <a:bodyPr rtlCol="0" anchor="ctr"/>
+          <a:lstStyle/>
+          <a:p>
+            <a:pPr algn="ctr"/>
+            <a:endParaRPr lang="en-US">
+              <a:solidFill>
+                <a:schemeClr val="tx1"/>
+              </a:solidFill>
+            </a:endParaRPr>
+          </a:p>
+        </p:txBody>
+      </p:sp>
+      <p:sp>
+        <p:nvSpPr>
+          <p:cNvPr id="75" name="Rectangle: Rounded Corners 74">
+            <a:extLst>
+              <a:ext uri="{FF2B5EF4-FFF2-40B4-BE49-F238E27FC236}">
+                <a16:creationId xmlns:a16="http://schemas.microsoft.com/office/drawing/2014/main" id="{9BA504DB-3D9C-4F0E-940B-B6239297B2D9}"/>
+              </a:ext>
+            </a:extLst>
+          </p:cNvPr>
+          <p:cNvSpPr/>
+          <p:nvPr/>
+        </p:nvSpPr>
+        <p:spPr>
+          <a:xfrm>
+            <a:off x="10705199" y="2764339"/>
+            <a:ext cx="849980" cy="911558"/>
+          </a:xfrm>
+          <a:prstGeom prst="roundRect">
+            <a:avLst/>
+          </a:prstGeom>
+          <a:solidFill>
+            <a:schemeClr val="tx2">
+              <a:lumMod val="20000"/>
+              <a:lumOff val="80000"/>
+            </a:schemeClr>
+          </a:solidFill>
+          <a:ln>
+            <a:solidFill>
+              <a:schemeClr val="tx1">
+                <a:lumMod val="95000"/>
+                <a:lumOff val="5000"/>
+              </a:schemeClr>
+            </a:solidFill>
+          </a:ln>
+        </p:spPr>
+        <p:style>
+          <a:lnRef idx="2">
+            <a:schemeClr val="accent1">
+              <a:shade val="50000"/>
+            </a:schemeClr>
+          </a:lnRef>
+          <a:fillRef idx="1">
+            <a:schemeClr val="accent1"/>
+          </a:fillRef>
+          <a:effectRef idx="0">
+            <a:schemeClr val="accent1"/>
+          </a:effectRef>
+          <a:fontRef idx="minor">
+            <a:schemeClr val="lt1"/>
+          </a:fontRef>
+        </p:style>
+        <p:txBody>
+          <a:bodyPr rtlCol="0" anchor="ctr"/>
+          <a:lstStyle/>
+          <a:p>
+            <a:pPr algn="ctr"/>
+            <a:r>
+              <a:rPr lang="en-US" sz="1400" dirty="0">
+                <a:solidFill>
+                  <a:schemeClr val="tx1"/>
+                </a:solidFill>
+              </a:rPr>
+              <a:t>PC</a:t>
+            </a:r>
+          </a:p>
+        </p:txBody>
+      </p:sp>
+      <p:sp>
+        <p:nvSpPr>
+          <p:cNvPr id="76" name="Arrow: Right 75">
+            <a:extLst>
+              <a:ext uri="{FF2B5EF4-FFF2-40B4-BE49-F238E27FC236}">
+                <a16:creationId xmlns:a16="http://schemas.microsoft.com/office/drawing/2014/main" id="{CA82AAAC-D484-43B8-BA03-01DFAD1B56B4}"/>
+              </a:ext>
+            </a:extLst>
+          </p:cNvPr>
+          <p:cNvSpPr/>
+          <p:nvPr/>
+        </p:nvSpPr>
+        <p:spPr>
+          <a:xfrm>
+            <a:off x="9574510" y="3151973"/>
+            <a:ext cx="591387" cy="214261"/>
+          </a:xfrm>
+          <a:prstGeom prst="rightArrow">
+            <a:avLst/>
+          </a:prstGeom>
+          <a:solidFill>
+            <a:schemeClr val="tx2">
+              <a:lumMod val="20000"/>
+              <a:lumOff val="80000"/>
+            </a:schemeClr>
+          </a:solidFill>
+          <a:ln>
+            <a:solidFill>
+              <a:schemeClr val="tx1">
+                <a:lumMod val="95000"/>
+                <a:lumOff val="5000"/>
+              </a:schemeClr>
+            </a:solidFill>
+          </a:ln>
+        </p:spPr>
+        <p:style>
+          <a:lnRef idx="2">
+            <a:schemeClr val="accent1">
+              <a:shade val="50000"/>
+            </a:schemeClr>
+          </a:lnRef>
+          <a:fillRef idx="1">
+            <a:schemeClr val="accent1"/>
+          </a:fillRef>
+          <a:effectRef idx="0">
+            <a:schemeClr val="accent1"/>
+          </a:effectRef>
+          <a:fontRef idx="minor">
+            <a:schemeClr val="lt1"/>
+          </a:fontRef>
+        </p:style>
+        <p:txBody>
+          <a:bodyPr rtlCol="0" anchor="ctr"/>
+          <a:lstStyle/>
+          <a:p>
+            <a:pPr algn="ctr"/>
+            <a:endParaRPr lang="en-US">
+              <a:solidFill>
+                <a:schemeClr val="tx1"/>
+              </a:solidFill>
+            </a:endParaRPr>
+          </a:p>
+        </p:txBody>
+      </p:sp>
+      <p:sp>
+        <p:nvSpPr>
+          <p:cNvPr id="83" name="Rectangle: Rounded Corners 82">
+            <a:extLst>
+              <a:ext uri="{FF2B5EF4-FFF2-40B4-BE49-F238E27FC236}">
+                <a16:creationId xmlns:a16="http://schemas.microsoft.com/office/drawing/2014/main" id="{6D4FE0F0-3310-4332-8D5D-4244806715EA}"/>
+              </a:ext>
+            </a:extLst>
+          </p:cNvPr>
+          <p:cNvSpPr/>
+          <p:nvPr/>
+        </p:nvSpPr>
+        <p:spPr>
+          <a:xfrm>
+            <a:off x="4302545" y="2883237"/>
+            <a:ext cx="1112905" cy="724646"/>
+          </a:xfrm>
+          <a:prstGeom prst="roundRect">
+            <a:avLst/>
+          </a:prstGeom>
+          <a:solidFill>
+            <a:schemeClr val="tx2">
+              <a:lumMod val="20000"/>
+              <a:lumOff val="80000"/>
+            </a:schemeClr>
+          </a:solidFill>
+          <a:ln>
+            <a:solidFill>
+              <a:schemeClr val="tx1">
+                <a:lumMod val="95000"/>
+                <a:lumOff val="5000"/>
+              </a:schemeClr>
+            </a:solidFill>
+          </a:ln>
+        </p:spPr>
+        <p:style>
+          <a:lnRef idx="2">
+            <a:schemeClr val="accent1">
+              <a:shade val="50000"/>
+            </a:schemeClr>
+          </a:lnRef>
+          <a:fillRef idx="1">
+            <a:schemeClr val="accent1"/>
+          </a:fillRef>
+          <a:effectRef idx="0">
+            <a:schemeClr val="accent1"/>
+          </a:effectRef>
+          <a:fontRef idx="minor">
+            <a:schemeClr val="lt1"/>
+          </a:fontRef>
+        </p:style>
+        <p:txBody>
+          <a:bodyPr rtlCol="0" anchor="ctr"/>
+          <a:lstStyle/>
+          <a:p>
+            <a:pPr algn="ctr"/>
+            <a:r>
+              <a:rPr lang="en-US" sz="1600" dirty="0">
+                <a:solidFill>
+                  <a:schemeClr val="tx1"/>
+                </a:solidFill>
+              </a:rPr>
+              <a:t>32-b Counters</a:t>
+            </a:r>
+          </a:p>
+        </p:txBody>
+      </p:sp>
+      <p:sp>
+        <p:nvSpPr>
+          <p:cNvPr id="84" name="Rectangle: Rounded Corners 83">
+            <a:extLst>
+              <a:ext uri="{FF2B5EF4-FFF2-40B4-BE49-F238E27FC236}">
+                <a16:creationId xmlns:a16="http://schemas.microsoft.com/office/drawing/2014/main" id="{2D1D9383-D26B-440E-A1FE-9EC99BC5709A}"/>
+              </a:ext>
+            </a:extLst>
+          </p:cNvPr>
+          <p:cNvSpPr/>
+          <p:nvPr/>
+        </p:nvSpPr>
+        <p:spPr>
+          <a:xfrm>
+            <a:off x="4382664" y="2927671"/>
+            <a:ext cx="1112905" cy="724646"/>
+          </a:xfrm>
+          <a:prstGeom prst="roundRect">
+            <a:avLst/>
+          </a:prstGeom>
+          <a:solidFill>
+            <a:schemeClr val="tx2">
+              <a:lumMod val="20000"/>
+              <a:lumOff val="80000"/>
+            </a:schemeClr>
+          </a:solidFill>
+          <a:ln>
+            <a:solidFill>
+              <a:schemeClr val="tx1">
+                <a:lumMod val="95000"/>
+                <a:lumOff val="5000"/>
+              </a:schemeClr>
+            </a:solidFill>
+          </a:ln>
+        </p:spPr>
+        <p:style>
+          <a:lnRef idx="2">
+            <a:schemeClr val="accent1">
+              <a:shade val="50000"/>
+            </a:schemeClr>
+          </a:lnRef>
+          <a:fillRef idx="1">
+            <a:schemeClr val="accent1"/>
+          </a:fillRef>
+          <a:effectRef idx="0">
+            <a:schemeClr val="accent1"/>
+          </a:effectRef>
+          <a:fontRef idx="minor">
+            <a:schemeClr val="lt1"/>
+          </a:fontRef>
+        </p:style>
+        <p:txBody>
+          <a:bodyPr rtlCol="0" anchor="ctr"/>
+          <a:lstStyle/>
+          <a:p>
+            <a:pPr algn="ctr"/>
+            <a:r>
+              <a:rPr lang="en-US" sz="1600" dirty="0">
+                <a:solidFill>
+                  <a:schemeClr val="tx1"/>
+                </a:solidFill>
+              </a:rPr>
+              <a:t>32-b Counters</a:t>
+            </a:r>
+          </a:p>
+        </p:txBody>
+      </p:sp>
+      <p:sp>
+        <p:nvSpPr>
+          <p:cNvPr id="85" name="TextBox 84">
+            <a:extLst>
+              <a:ext uri="{FF2B5EF4-FFF2-40B4-BE49-F238E27FC236}">
+                <a16:creationId xmlns:a16="http://schemas.microsoft.com/office/drawing/2014/main" id="{FF2CA7E9-66E2-4B24-BA80-94D611A59062}"/>
+              </a:ext>
+            </a:extLst>
+          </p:cNvPr>
+          <p:cNvSpPr txBox="1"/>
+          <p:nvPr/>
+        </p:nvSpPr>
+        <p:spPr>
+          <a:xfrm>
+            <a:off x="930069" y="3624243"/>
+            <a:ext cx="401071" cy="369332"/>
+          </a:xfrm>
+          <a:prstGeom prst="rect">
+            <a:avLst/>
+          </a:prstGeom>
+          <a:solidFill>
+            <a:schemeClr val="bg1"/>
+          </a:solidFill>
+          <a:ln>
+            <a:noFill/>
+          </a:ln>
+        </p:spPr>
+        <p:txBody>
+          <a:bodyPr wrap="none" rtlCol="0">
+            <a:spAutoFit/>
+          </a:bodyPr>
+          <a:lstStyle/>
+          <a:p>
+            <a:r>
+              <a:rPr lang="en-US" dirty="0"/>
+              <a:t>x8</a:t>
+            </a:r>
+          </a:p>
+        </p:txBody>
+      </p:sp>
+    </p:spTree>
+    <p:extLst>
+      <p:ext uri="{BB962C8B-B14F-4D97-AF65-F5344CB8AC3E}">
+        <p14:creationId xmlns:p14="http://schemas.microsoft.com/office/powerpoint/2010/main" val="1182699747"/>
+      </p:ext>
+    </p:extLst>
+  </p:cSld>
+  <p:clrMapOvr>
+    <a:masterClrMapping/>
+  </p:clrMapOvr>
+</p:sld>
+</file>
+
 <file path=ppt/theme/theme1.xml><?xml version="1.0" encoding="utf-8"?>
 <a:theme xmlns:a="http://schemas.openxmlformats.org/drawingml/2006/main" name="Office Theme">
   <a:themeElements>

</xml_diff>